<commit_message>
Update presentation and lists of cities
</commit_message>
<xml_diff>
--- a/Презентация GeoQuest.pptx
+++ b/Презентация GeoQuest.pptx
@@ -223,7 +223,7 @@
           <a:p>
             <a:fld id="{700B8B7E-C4FC-3647-948A-9C9E38C730D4}" type="datetimeFigureOut">
               <a:rPr lang="ru-RU" smtClean="0"/>
-              <a:t>24.12.2023</a:t>
+              <a:t>25.12.2023</a:t>
             </a:fld>
             <a:endParaRPr lang="ru-RU"/>
           </a:p>
@@ -805,7 +805,7 @@
           <a:p>
             <a:fld id="{680DAA94-26E2-1742-B349-986C74FAAB48}" type="datetimeFigureOut">
               <a:rPr lang="ru-RU" smtClean="0"/>
-              <a:t>24.12.2023</a:t>
+              <a:t>25.12.2023</a:t>
             </a:fld>
             <a:endParaRPr lang="ru-RU"/>
           </a:p>
@@ -1003,7 +1003,7 @@
           <a:p>
             <a:fld id="{680DAA94-26E2-1742-B349-986C74FAAB48}" type="datetimeFigureOut">
               <a:rPr lang="ru-RU" smtClean="0"/>
-              <a:t>24.12.2023</a:t>
+              <a:t>25.12.2023</a:t>
             </a:fld>
             <a:endParaRPr lang="ru-RU"/>
           </a:p>
@@ -1211,7 +1211,7 @@
           <a:p>
             <a:fld id="{680DAA94-26E2-1742-B349-986C74FAAB48}" type="datetimeFigureOut">
               <a:rPr lang="ru-RU" smtClean="0"/>
-              <a:t>24.12.2023</a:t>
+              <a:t>25.12.2023</a:t>
             </a:fld>
             <a:endParaRPr lang="ru-RU"/>
           </a:p>
@@ -1409,7 +1409,7 @@
           <a:p>
             <a:fld id="{680DAA94-26E2-1742-B349-986C74FAAB48}" type="datetimeFigureOut">
               <a:rPr lang="ru-RU" smtClean="0"/>
-              <a:t>24.12.2023</a:t>
+              <a:t>25.12.2023</a:t>
             </a:fld>
             <a:endParaRPr lang="ru-RU"/>
           </a:p>
@@ -1684,7 +1684,7 @@
           <a:p>
             <a:fld id="{680DAA94-26E2-1742-B349-986C74FAAB48}" type="datetimeFigureOut">
               <a:rPr lang="ru-RU" smtClean="0"/>
-              <a:t>24.12.2023</a:t>
+              <a:t>25.12.2023</a:t>
             </a:fld>
             <a:endParaRPr lang="ru-RU"/>
           </a:p>
@@ -1949,7 +1949,7 @@
           <a:p>
             <a:fld id="{680DAA94-26E2-1742-B349-986C74FAAB48}" type="datetimeFigureOut">
               <a:rPr lang="ru-RU" smtClean="0"/>
-              <a:t>24.12.2023</a:t>
+              <a:t>25.12.2023</a:t>
             </a:fld>
             <a:endParaRPr lang="ru-RU"/>
           </a:p>
@@ -2361,7 +2361,7 @@
           <a:p>
             <a:fld id="{680DAA94-26E2-1742-B349-986C74FAAB48}" type="datetimeFigureOut">
               <a:rPr lang="ru-RU" smtClean="0"/>
-              <a:t>24.12.2023</a:t>
+              <a:t>25.12.2023</a:t>
             </a:fld>
             <a:endParaRPr lang="ru-RU"/>
           </a:p>
@@ -2502,7 +2502,7 @@
           <a:p>
             <a:fld id="{680DAA94-26E2-1742-B349-986C74FAAB48}" type="datetimeFigureOut">
               <a:rPr lang="ru-RU" smtClean="0"/>
-              <a:t>24.12.2023</a:t>
+              <a:t>25.12.2023</a:t>
             </a:fld>
             <a:endParaRPr lang="ru-RU"/>
           </a:p>
@@ -2615,7 +2615,7 @@
           <a:p>
             <a:fld id="{680DAA94-26E2-1742-B349-986C74FAAB48}" type="datetimeFigureOut">
               <a:rPr lang="ru-RU" smtClean="0"/>
-              <a:t>24.12.2023</a:t>
+              <a:t>25.12.2023</a:t>
             </a:fld>
             <a:endParaRPr lang="ru-RU"/>
           </a:p>
@@ -2926,7 +2926,7 @@
           <a:p>
             <a:fld id="{680DAA94-26E2-1742-B349-986C74FAAB48}" type="datetimeFigureOut">
               <a:rPr lang="ru-RU" smtClean="0"/>
-              <a:t>24.12.2023</a:t>
+              <a:t>25.12.2023</a:t>
             </a:fld>
             <a:endParaRPr lang="ru-RU"/>
           </a:p>
@@ -3214,7 +3214,7 @@
           <a:p>
             <a:fld id="{680DAA94-26E2-1742-B349-986C74FAAB48}" type="datetimeFigureOut">
               <a:rPr lang="ru-RU" smtClean="0"/>
-              <a:t>24.12.2023</a:t>
+              <a:t>25.12.2023</a:t>
             </a:fld>
             <a:endParaRPr lang="ru-RU"/>
           </a:p>
@@ -3455,7 +3455,7 @@
           <a:p>
             <a:fld id="{680DAA94-26E2-1742-B349-986C74FAAB48}" type="datetimeFigureOut">
               <a:rPr lang="ru-RU" smtClean="0"/>
-              <a:t>24.12.2023</a:t>
+              <a:t>25.12.2023</a:t>
             </a:fld>
             <a:endParaRPr lang="ru-RU"/>
           </a:p>
@@ -6229,8 +6229,8 @@
           </a:p>
         </p:txBody>
       </p:sp>
-      <mc:AlternateContent xmlns:mc="http://schemas.openxmlformats.org/markup-compatibility/2006">
-        <mc:Choice xmlns:a14="http://schemas.microsoft.com/office/drawing/2010/main" Requires="a14">
+      <mc:AlternateContent xmlns:mc="http://schemas.openxmlformats.org/markup-compatibility/2006" xmlns:a14="http://schemas.microsoft.com/office/drawing/2010/main">
+        <mc:Choice Requires="a14">
           <p:sp>
             <p:nvSpPr>
               <p:cNvPr id="2" name="TextBox 1">
@@ -6259,6 +6259,7 @@
               </a:bodyPr>
               <a:lstStyle/>
               <a:p>
+                <a:pPr/>
                 <a14:m>
                   <m:oMathPara xmlns:m="http://schemas.openxmlformats.org/officeDocument/2006/math">
                     <m:oMathParaPr>
@@ -6365,7 +6366,7 @@
             </p:txBody>
           </p:sp>
         </mc:Choice>
-        <mc:Fallback>
+        <mc:Fallback xmlns="">
           <p:sp>
             <p:nvSpPr>
               <p:cNvPr id="2" name="TextBox 1">
@@ -6410,8 +6411,8 @@
           </p:sp>
         </mc:Fallback>
       </mc:AlternateContent>
-      <mc:AlternateContent xmlns:mc="http://schemas.openxmlformats.org/markup-compatibility/2006">
-        <mc:Choice xmlns:a14="http://schemas.microsoft.com/office/drawing/2010/main" Requires="a14">
+      <mc:AlternateContent xmlns:mc="http://schemas.openxmlformats.org/markup-compatibility/2006" xmlns:a14="http://schemas.microsoft.com/office/drawing/2010/main">
+        <mc:Choice Requires="a14">
           <p:sp>
             <p:nvSpPr>
               <p:cNvPr id="4" name="Заголовок 1">
@@ -6480,7 +6481,7 @@
             </p:txBody>
           </p:sp>
         </mc:Choice>
-        <mc:Fallback>
+        <mc:Fallback xmlns="">
           <p:sp>
             <p:nvSpPr>
               <p:cNvPr id="4" name="Заголовок 1">
@@ -9147,13 +9148,10 @@
           </a:p>
           <a:p>
             <a:r>
-              <a:rPr lang="en-US" sz="3200" b="1" i="1" u="sng" dirty="0">
-                <a:solidFill>
-                  <a:srgbClr val="FF0000"/>
-                </a:solidFill>
-                <a:latin typeface="HSE Sans" panose="02000000000000000000" pitchFamily="2" charset="0"/>
-              </a:rPr>
-              <a:t>X</a:t>
+              <a:rPr lang="ru-RU" sz="3200" dirty="0">
+                <a:latin typeface="HSE Sans" panose="02000000000000000000" pitchFamily="2" charset="0"/>
+              </a:rPr>
+              <a:t>1115</a:t>
             </a:r>
             <a:r>
               <a:rPr lang="en-US" sz="3200" dirty="0">
@@ -9334,13 +9332,10 @@
           </a:p>
           <a:p>
             <a:r>
-              <a:rPr lang="en-US" sz="3200" b="1" i="1" u="sng" dirty="0">
-                <a:solidFill>
-                  <a:srgbClr val="FF0000"/>
-                </a:solidFill>
-                <a:latin typeface="HSE Sans" panose="02000000000000000000" pitchFamily="2" charset="0"/>
-              </a:rPr>
-              <a:t>Y</a:t>
+              <a:rPr lang="ru-RU" sz="3200" dirty="0">
+                <a:latin typeface="HSE Sans" panose="02000000000000000000" pitchFamily="2" charset="0"/>
+              </a:rPr>
+              <a:t>93</a:t>
             </a:r>
             <a:r>
               <a:rPr lang="en-US" sz="3200" dirty="0">
@@ -9352,7 +9347,7 @@
               <a:rPr lang="ru-RU" sz="3200" dirty="0">
                 <a:latin typeface="HSE Sans" panose="02000000000000000000" pitchFamily="2" charset="0"/>
               </a:rPr>
-              <a:t>городов</a:t>
+              <a:t>города</a:t>
             </a:r>
           </a:p>
         </p:txBody>

</xml_diff>